<commit_message>
Reviewing notes for the upcoming final
</commit_message>
<xml_diff>
--- a/Lectures/Lecture 14_Probabilistic Models.pptx
+++ b/Lectures/Lecture 14_Probabilistic Models.pptx
@@ -1017,7 +1017,7 @@
             <a:fld id="{1E00213A-4496-8E41-939D-6D779164903A}" type="datetimeFigureOut">
               <a:rPr lang="en-US" smtClean="0"/>
               <a:pPr/>
-              <a:t>10/26/23</a:t>
+              <a:t>12/12/23</a:t>
             </a:fld>
             <a:endParaRPr lang="en-US"/>
           </a:p>
@@ -2756,7 +2756,7 @@
             <a:fld id="{7B6FE768-D535-DB4F-A86D-18423950C428}" type="datetimeFigureOut">
               <a:rPr lang="en-US" smtClean="0"/>
               <a:pPr/>
-              <a:t>10/26/23</a:t>
+              <a:t>12/12/23</a:t>
             </a:fld>
             <a:endParaRPr lang="en-US"/>
           </a:p>
@@ -2948,7 +2948,7 @@
             <a:fld id="{7B6FE768-D535-DB4F-A86D-18423950C428}" type="datetimeFigureOut">
               <a:rPr lang="en-US" smtClean="0"/>
               <a:pPr/>
-              <a:t>10/26/23</a:t>
+              <a:t>12/12/23</a:t>
             </a:fld>
             <a:endParaRPr lang="en-US"/>
           </a:p>
@@ -3134,7 +3134,7 @@
             <a:fld id="{7B6FE768-D535-DB4F-A86D-18423950C428}" type="datetimeFigureOut">
               <a:rPr lang="en-US" smtClean="0"/>
               <a:pPr/>
-              <a:t>10/26/23</a:t>
+              <a:t>12/12/23</a:t>
             </a:fld>
             <a:endParaRPr lang="en-US"/>
           </a:p>
@@ -3398,7 +3398,7 @@
             <a:fld id="{7B6FE768-D535-DB4F-A86D-18423950C428}" type="datetimeFigureOut">
               <a:rPr lang="en-US" smtClean="0"/>
               <a:pPr/>
-              <a:t>10/26/23</a:t>
+              <a:t>12/12/23</a:t>
             </a:fld>
             <a:endParaRPr lang="en-US"/>
           </a:p>
@@ -3815,7 +3815,7 @@
             <a:fld id="{7B6FE768-D535-DB4F-A86D-18423950C428}" type="datetimeFigureOut">
               <a:rPr lang="en-US" smtClean="0"/>
               <a:pPr/>
-              <a:t>10/26/23</a:t>
+              <a:t>12/12/23</a:t>
             </a:fld>
             <a:endParaRPr lang="en-US"/>
           </a:p>
@@ -4058,7 +4058,7 @@
             <a:fld id="{7B6FE768-D535-DB4F-A86D-18423950C428}" type="datetimeFigureOut">
               <a:rPr lang="en-US" smtClean="0"/>
               <a:pPr/>
-              <a:t>10/26/23</a:t>
+              <a:t>12/12/23</a:t>
             </a:fld>
             <a:endParaRPr lang="en-US"/>
           </a:p>
@@ -4295,7 +4295,7 @@
             <a:fld id="{7B6FE768-D535-DB4F-A86D-18423950C428}" type="datetimeFigureOut">
               <a:rPr lang="en-US" smtClean="0"/>
               <a:pPr/>
-              <a:t>10/26/23</a:t>
+              <a:t>12/12/23</a:t>
             </a:fld>
             <a:endParaRPr lang="en-US"/>
           </a:p>
@@ -4491,7 +4491,7 @@
             <a:fld id="{7B6FE768-D535-DB4F-A86D-18423950C428}" type="datetimeFigureOut">
               <a:rPr lang="en-US" smtClean="0"/>
               <a:pPr/>
-              <a:t>10/26/23</a:t>
+              <a:t>12/12/23</a:t>
             </a:fld>
             <a:endParaRPr lang="en-US"/>
           </a:p>
@@ -4591,7 +4591,7 @@
             <a:fld id="{7B6FE768-D535-DB4F-A86D-18423950C428}" type="datetimeFigureOut">
               <a:rPr lang="en-US" smtClean="0"/>
               <a:pPr/>
-              <a:t>10/26/23</a:t>
+              <a:t>12/12/23</a:t>
             </a:fld>
             <a:endParaRPr lang="en-US"/>
           </a:p>
@@ -4728,7 +4728,7 @@
             <a:fld id="{7B6FE768-D535-DB4F-A86D-18423950C428}" type="datetimeFigureOut">
               <a:rPr lang="en-US" smtClean="0"/>
               <a:pPr/>
-              <a:t>10/26/23</a:t>
+              <a:t>12/12/23</a:t>
             </a:fld>
             <a:endParaRPr lang="en-US"/>
           </a:p>
@@ -5247,7 +5247,7 @@
             <a:fld id="{7B6FE768-D535-DB4F-A86D-18423950C428}" type="datetimeFigureOut">
               <a:rPr lang="en-US" smtClean="0"/>
               <a:pPr/>
-              <a:t>10/26/23</a:t>
+              <a:t>12/12/23</a:t>
             </a:fld>
             <a:endParaRPr lang="en-US"/>
           </a:p>
@@ -5508,7 +5508,7 @@
             <a:fld id="{7B6FE768-D535-DB4F-A86D-18423950C428}" type="datetimeFigureOut">
               <a:rPr lang="en-US" smtClean="0"/>
               <a:pPr/>
-              <a:t>10/26/23</a:t>
+              <a:t>12/12/23</a:t>
             </a:fld>
             <a:endParaRPr lang="en-US"/>
           </a:p>
@@ -14509,7 +14509,7 @@
                       <a:noFill/>
                       <a:extLst>
                         <a:ext uri="{909E8E84-426E-40dd-AFC4-6F175D3DCCD1}">
-                          <a14:hiddenFill xmlns="" xmlns:a14="http://schemas.microsoft.com/office/drawing/2010/main">
+                          <a14:hiddenFill xmlns:a14="http://schemas.microsoft.com/office/drawing/2010/main" xmlns="">
                             <a:solidFill>
                               <a:srgbClr val="FFFFFF"/>
                             </a:solidFill>
@@ -14854,7 +14854,7 @@
                       <a:noFill/>
                       <a:extLst>
                         <a:ext uri="{909E8E84-426E-40dd-AFC4-6F175D3DCCD1}">
-                          <a14:hiddenFill xmlns="" xmlns:a14="http://schemas.microsoft.com/office/drawing/2010/main">
+                          <a14:hiddenFill xmlns:a14="http://schemas.microsoft.com/office/drawing/2010/main" xmlns="">
                             <a:solidFill>
                               <a:srgbClr val="FFFFFF"/>
                             </a:solidFill>
@@ -15248,7 +15248,7 @@
                       <a:noFill/>
                       <a:extLst>
                         <a:ext uri="{909E8E84-426E-40dd-AFC4-6F175D3DCCD1}">
-                          <a14:hiddenFill xmlns="" xmlns:a14="http://schemas.microsoft.com/office/drawing/2010/main">
+                          <a14:hiddenFill xmlns:a14="http://schemas.microsoft.com/office/drawing/2010/main" xmlns="">
                             <a:solidFill>
                               <a:srgbClr val="FFFFFF"/>
                             </a:solidFill>
@@ -15722,7 +15722,7 @@
                       <a:noFill/>
                       <a:extLst>
                         <a:ext uri="{909E8E84-426E-40dd-AFC4-6F175D3DCCD1}">
-                          <a14:hiddenFill xmlns="" xmlns:a14="http://schemas.microsoft.com/office/drawing/2010/main">
+                          <a14:hiddenFill xmlns:a14="http://schemas.microsoft.com/office/drawing/2010/main" xmlns="">
                             <a:solidFill>
                               <a:srgbClr val="FFFFFF"/>
                             </a:solidFill>
@@ -16102,7 +16102,7 @@
                       <a:noFill/>
                       <a:extLst>
                         <a:ext uri="{909E8E84-426E-40dd-AFC4-6F175D3DCCD1}">
-                          <a14:hiddenFill xmlns="" xmlns:a14="http://schemas.microsoft.com/office/drawing/2010/main">
+                          <a14:hiddenFill xmlns:a14="http://schemas.microsoft.com/office/drawing/2010/main" xmlns="">
                             <a:solidFill>
                               <a:srgbClr val="FFFFFF"/>
                             </a:solidFill>
@@ -16678,7 +16678,7 @@
                       <a:noFill/>
                       <a:extLst>
                         <a:ext uri="{909E8E84-426E-40dd-AFC4-6F175D3DCCD1}">
-                          <a14:hiddenFill xmlns="" xmlns:a14="http://schemas.microsoft.com/office/drawing/2010/main">
+                          <a14:hiddenFill xmlns:a14="http://schemas.microsoft.com/office/drawing/2010/main" xmlns="">
                             <a:solidFill>
                               <a:srgbClr val="FFFFFF"/>
                             </a:solidFill>
@@ -17058,7 +17058,7 @@
                       <a:noFill/>
                       <a:extLst>
                         <a:ext uri="{909E8E84-426E-40dd-AFC4-6F175D3DCCD1}">
-                          <a14:hiddenFill xmlns="" xmlns:a14="http://schemas.microsoft.com/office/drawing/2010/main">
+                          <a14:hiddenFill xmlns:a14="http://schemas.microsoft.com/office/drawing/2010/main" xmlns="">
                             <a:solidFill>
                               <a:srgbClr val="FFFFFF"/>
                             </a:solidFill>
@@ -21979,7 +21979,7 @@
                       <a:noFill/>
                       <a:extLst>
                         <a:ext uri="{909E8E84-426E-40dd-AFC4-6F175D3DCCD1}">
-                          <a14:hiddenFill xmlns="" xmlns:a14="http://schemas.microsoft.com/office/drawing/2010/main">
+                          <a14:hiddenFill xmlns:a14="http://schemas.microsoft.com/office/drawing/2010/main" xmlns="">
                             <a:solidFill>
                               <a:srgbClr val="FFFFFF"/>
                             </a:solidFill>
@@ -22049,7 +22049,7 @@
                       <a:noFill/>
                       <a:extLst>
                         <a:ext uri="{909E8E84-426E-40dd-AFC4-6F175D3DCCD1}">
-                          <a14:hiddenFill xmlns="" xmlns:a14="http://schemas.microsoft.com/office/drawing/2010/main">
+                          <a14:hiddenFill xmlns:a14="http://schemas.microsoft.com/office/drawing/2010/main" xmlns="">
                             <a:solidFill>
                               <a:srgbClr val="FFFFFF"/>
                             </a:solidFill>

</xml_diff>